<commit_message>
i highlighted the title
</commit_message>
<xml_diff>
--- a/MSA Team Final Exam_AY2017.pptx
+++ b/MSA Team Final Exam_AY2017.pptx
@@ -5333,8 +5333,16 @@
           <a:p>
             <a:pPr eaLnBrk="1" hangingPunct="1"/>
             <a:r>
-              <a:rPr lang="en-US" altLang="en-US"/>
-              <a:t>Modeling, Simulation, and Analysis (MSA)</a:t>
+              <a:rPr lang="en-US" altLang="en-US" dirty="0">
+                <a:highlight>
+                  <a:srgbClr val="FFFF00"/>
+                </a:highlight>
+              </a:rPr>
+              <a:t>Modeling, Simulation, and Analysis (MSA</a:t>
+            </a:r>
+            <a:r>
+              <a:rPr lang="en-US" altLang="en-US" dirty="0"/>
+              <a:t>)</a:t>
             </a:r>
           </a:p>
         </p:txBody>

</xml_diff>

<commit_message>
I updated with red highlight
</commit_message>
<xml_diff>
--- a/MSA Team Final Exam_AY2017.pptx
+++ b/MSA Team Final Exam_AY2017.pptx
@@ -5333,16 +5333,8 @@
           <a:p>
             <a:pPr eaLnBrk="1" hangingPunct="1"/>
             <a:r>
-              <a:rPr lang="en-US" altLang="en-US" dirty="0">
-                <a:highlight>
-                  <a:srgbClr val="FFFF00"/>
-                </a:highlight>
-              </a:rPr>
-              <a:t>Modeling, Simulation, and Analysis (MSA</a:t>
-            </a:r>
-            <a:r>
-              <a:rPr lang="en-US" altLang="en-US" dirty="0"/>
-              <a:t>)</a:t>
+              <a:rPr lang="en-US" altLang="en-US"/>
+              <a:t>Modeling, Simulation, and Analysis (MSA)</a:t>
             </a:r>
           </a:p>
         </p:txBody>
@@ -5373,7 +5365,11 @@
               </a:lnSpc>
             </a:pPr>
             <a:r>
-              <a:rPr lang="en-US" altLang="en-US" dirty="0"/>
+              <a:rPr lang="en-US" altLang="en-US" dirty="0">
+                <a:highlight>
+                  <a:srgbClr val="FF0000"/>
+                </a:highlight>
+              </a:rPr>
               <a:t>Team Final Exam</a:t>
             </a:r>
           </a:p>

</xml_diff>

<commit_message>
i changed title to yellow
</commit_message>
<xml_diff>
--- a/MSA Team Final Exam_AY2017.pptx
+++ b/MSA Team Final Exam_AY2017.pptx
@@ -5333,7 +5333,11 @@
           <a:p>
             <a:pPr eaLnBrk="1" hangingPunct="1"/>
             <a:r>
-              <a:rPr lang="en-US" altLang="en-US"/>
+              <a:rPr lang="en-US" altLang="en-US" dirty="0">
+                <a:highlight>
+                  <a:srgbClr val="FFFF00"/>
+                </a:highlight>
+              </a:rPr>
               <a:t>Modeling, Simulation, and Analysis (MSA)</a:t>
             </a:r>
           </a:p>

</xml_diff>

<commit_message>
I added a wordart Text
</commit_message>
<xml_diff>
--- a/MSA Team Final Exam_AY2017.pptx
+++ b/MSA Team Final Exam_AY2017.pptx
@@ -5636,6 +5636,100 @@
               <a:rPr lang="en-US" altLang="en-US" sz="2400"/>
               <a:t>Note: in Questions 2 and 3, do not try to provide great detail. This is a top-level identification of key architectural artifacts,</a:t>
             </a:r>
+          </a:p>
+        </p:txBody>
+      </p:sp>
+      <p:sp>
+        <p:nvSpPr>
+          <p:cNvPr id="2" name="Rectangle 1">
+            <a:extLst>
+              <a:ext uri="{FF2B5EF4-FFF2-40B4-BE49-F238E27FC236}">
+                <a16:creationId xmlns:a16="http://schemas.microsoft.com/office/drawing/2014/main" id="{1F63CE23-3F2E-46E9-A484-D11DFBC97BB6}"/>
+              </a:ext>
+            </a:extLst>
+          </p:cNvPr>
+          <p:cNvSpPr/>
+          <p:nvPr/>
+        </p:nvSpPr>
+        <p:spPr>
+          <a:xfrm>
+            <a:off x="1832900" y="1244541"/>
+            <a:ext cx="5478200" cy="1631216"/>
+          </a:xfrm>
+          <a:prstGeom prst="rect">
+            <a:avLst/>
+          </a:prstGeom>
+          <a:noFill/>
+        </p:spPr>
+        <p:txBody>
+          <a:bodyPr wrap="square" lIns="91440" tIns="45720" rIns="91440" bIns="45720">
+            <a:spAutoFit/>
+          </a:bodyPr>
+          <a:lstStyle/>
+          <a:p>
+            <a:pPr algn="ctr"/>
+            <a:r>
+              <a:rPr lang="en-US" altLang="en-US" sz="10000" b="1" cap="none" spc="0" dirty="0">
+                <a:ln w="12700">
+                  <a:solidFill>
+                    <a:schemeClr val="accent3">
+                      <a:lumMod val="50000"/>
+                    </a:schemeClr>
+                  </a:solidFill>
+                  <a:prstDash val="solid"/>
+                </a:ln>
+                <a:pattFill prst="narHorz">
+                  <a:fgClr>
+                    <a:schemeClr val="accent3"/>
+                  </a:fgClr>
+                  <a:bgClr>
+                    <a:schemeClr val="accent3">
+                      <a:lumMod val="40000"/>
+                      <a:lumOff val="60000"/>
+                    </a:schemeClr>
+                  </a:bgClr>
+                </a:pattFill>
+                <a:effectLst>
+                  <a:innerShdw blurRad="177800">
+                    <a:schemeClr val="accent3">
+                      <a:lumMod val="50000"/>
+                    </a:schemeClr>
+                  </a:innerShdw>
+                </a:effectLst>
+                <a:highlight>
+                  <a:srgbClr val="FFFF00"/>
+                </a:highlight>
+              </a:rPr>
+              <a:t>HI TEAM</a:t>
+            </a:r>
+            <a:endParaRPr lang="en-US" sz="10000" b="1" cap="none" spc="0" dirty="0">
+              <a:ln w="12700">
+                <a:solidFill>
+                  <a:schemeClr val="accent3">
+                    <a:lumMod val="50000"/>
+                  </a:schemeClr>
+                </a:solidFill>
+                <a:prstDash val="solid"/>
+              </a:ln>
+              <a:pattFill prst="narHorz">
+                <a:fgClr>
+                  <a:schemeClr val="accent3"/>
+                </a:fgClr>
+                <a:bgClr>
+                  <a:schemeClr val="accent3">
+                    <a:lumMod val="40000"/>
+                    <a:lumOff val="60000"/>
+                  </a:schemeClr>
+                </a:bgClr>
+              </a:pattFill>
+              <a:effectLst>
+                <a:innerShdw blurRad="177800">
+                  <a:schemeClr val="accent3">
+                    <a:lumMod val="50000"/>
+                  </a:schemeClr>
+                </a:innerShdw>
+              </a:effectLst>
+            </a:endParaRPr>
           </a:p>
         </p:txBody>
       </p:sp>

</xml_diff>

<commit_message>
Team Final Exam - Test green
</commit_message>
<xml_diff>
--- a/MSA Team Final Exam_AY2017.pptx
+++ b/MSA Team Final Exam_AY2017.pptx
@@ -5371,10 +5371,10 @@
             <a:r>
               <a:rPr lang="en-US" altLang="en-US" dirty="0">
                 <a:highlight>
-                  <a:srgbClr val="FF0000"/>
+                  <a:srgbClr val="00FF00"/>
                 </a:highlight>
               </a:rPr>
-              <a:t>Team Final Exam</a:t>
+              <a:t>Team Final Exam - green</a:t>
             </a:r>
           </a:p>
           <a:p>

</xml_diff>